<commit_message>
chore: add version markers (#91)
</commit_message>
<xml_diff>
--- a/.offline/social-card.pptx
+++ b/.offline/social-card.pptx
@@ -260,7 +260,7 @@
           <a:p>
             <a:fld id="{5010F1D1-8B29-4A0C-9016-D4BF2FAC25FD}" type="datetimeFigureOut">
               <a:rPr lang="en-US" smtClean="0"/>
-              <a:t>10/1/2023</a:t>
+              <a:t>10/20/2023</a:t>
             </a:fld>
             <a:endParaRPr lang="en-US"/>
           </a:p>
@@ -458,7 +458,7 @@
           <a:p>
             <a:fld id="{5010F1D1-8B29-4A0C-9016-D4BF2FAC25FD}" type="datetimeFigureOut">
               <a:rPr lang="en-US" smtClean="0"/>
-              <a:t>10/1/2023</a:t>
+              <a:t>10/20/2023</a:t>
             </a:fld>
             <a:endParaRPr lang="en-US"/>
           </a:p>
@@ -666,7 +666,7 @@
           <a:p>
             <a:fld id="{5010F1D1-8B29-4A0C-9016-D4BF2FAC25FD}" type="datetimeFigureOut">
               <a:rPr lang="en-US" smtClean="0"/>
-              <a:t>10/1/2023</a:t>
+              <a:t>10/20/2023</a:t>
             </a:fld>
             <a:endParaRPr lang="en-US"/>
           </a:p>
@@ -864,7 +864,7 @@
           <a:p>
             <a:fld id="{5010F1D1-8B29-4A0C-9016-D4BF2FAC25FD}" type="datetimeFigureOut">
               <a:rPr lang="en-US" smtClean="0"/>
-              <a:t>10/1/2023</a:t>
+              <a:t>10/20/2023</a:t>
             </a:fld>
             <a:endParaRPr lang="en-US"/>
           </a:p>
@@ -1139,7 +1139,7 @@
           <a:p>
             <a:fld id="{5010F1D1-8B29-4A0C-9016-D4BF2FAC25FD}" type="datetimeFigureOut">
               <a:rPr lang="en-US" smtClean="0"/>
-              <a:t>10/1/2023</a:t>
+              <a:t>10/20/2023</a:t>
             </a:fld>
             <a:endParaRPr lang="en-US"/>
           </a:p>
@@ -1404,7 +1404,7 @@
           <a:p>
             <a:fld id="{5010F1D1-8B29-4A0C-9016-D4BF2FAC25FD}" type="datetimeFigureOut">
               <a:rPr lang="en-US" smtClean="0"/>
-              <a:t>10/1/2023</a:t>
+              <a:t>10/20/2023</a:t>
             </a:fld>
             <a:endParaRPr lang="en-US"/>
           </a:p>
@@ -1816,7 +1816,7 @@
           <a:p>
             <a:fld id="{5010F1D1-8B29-4A0C-9016-D4BF2FAC25FD}" type="datetimeFigureOut">
               <a:rPr lang="en-US" smtClean="0"/>
-              <a:t>10/1/2023</a:t>
+              <a:t>10/20/2023</a:t>
             </a:fld>
             <a:endParaRPr lang="en-US"/>
           </a:p>
@@ -1957,7 +1957,7 @@
           <a:p>
             <a:fld id="{5010F1D1-8B29-4A0C-9016-D4BF2FAC25FD}" type="datetimeFigureOut">
               <a:rPr lang="en-US" smtClean="0"/>
-              <a:t>10/1/2023</a:t>
+              <a:t>10/20/2023</a:t>
             </a:fld>
             <a:endParaRPr lang="en-US"/>
           </a:p>
@@ -2070,7 +2070,7 @@
           <a:p>
             <a:fld id="{5010F1D1-8B29-4A0C-9016-D4BF2FAC25FD}" type="datetimeFigureOut">
               <a:rPr lang="en-US" smtClean="0"/>
-              <a:t>10/1/2023</a:t>
+              <a:t>10/20/2023</a:t>
             </a:fld>
             <a:endParaRPr lang="en-US"/>
           </a:p>
@@ -2381,7 +2381,7 @@
           <a:p>
             <a:fld id="{5010F1D1-8B29-4A0C-9016-D4BF2FAC25FD}" type="datetimeFigureOut">
               <a:rPr lang="en-US" smtClean="0"/>
-              <a:t>10/1/2023</a:t>
+              <a:t>10/20/2023</a:t>
             </a:fld>
             <a:endParaRPr lang="en-US"/>
           </a:p>
@@ -2669,7 +2669,7 @@
           <a:p>
             <a:fld id="{5010F1D1-8B29-4A0C-9016-D4BF2FAC25FD}" type="datetimeFigureOut">
               <a:rPr lang="en-US" smtClean="0"/>
-              <a:t>10/1/2023</a:t>
+              <a:t>10/20/2023</a:t>
             </a:fld>
             <a:endParaRPr lang="en-US"/>
           </a:p>
@@ -2910,7 +2910,7 @@
           <a:p>
             <a:fld id="{5010F1D1-8B29-4A0C-9016-D4BF2FAC25FD}" type="datetimeFigureOut">
               <a:rPr lang="en-US" smtClean="0"/>
-              <a:t>10/1/2023</a:t>
+              <a:t>10/20/2023</a:t>
             </a:fld>
             <a:endParaRPr lang="en-US"/>
           </a:p>
@@ -3316,7 +3316,7 @@
     <p:bg>
       <p:bgPr>
         <a:solidFill>
-          <a:srgbClr val="2E2E2E"/>
+          <a:schemeClr val="bg1"/>
         </a:solidFill>
         <a:effectLst/>
       </p:bgPr>
@@ -3335,12 +3335,65 @@
           <a:chExt cx="0" cy="0"/>
         </a:xfrm>
       </p:grpSpPr>
+      <p:sp>
+        <p:nvSpPr>
+          <p:cNvPr id="3" name="Rectangle 2">
+            <a:extLst>
+              <a:ext uri="{FF2B5EF4-FFF2-40B4-BE49-F238E27FC236}">
+                <a16:creationId xmlns:a16="http://schemas.microsoft.com/office/drawing/2014/main" id="{72133D17-283C-4F79-E8B6-33D2DEF3E0EE}"/>
+              </a:ext>
+            </a:extLst>
+          </p:cNvPr>
+          <p:cNvSpPr/>
+          <p:nvPr/>
+        </p:nvSpPr>
+        <p:spPr>
+          <a:xfrm>
+            <a:off x="0" y="0"/>
+            <a:ext cx="12192000" cy="6857999"/>
+          </a:xfrm>
+          <a:prstGeom prst="rect">
+            <a:avLst/>
+          </a:prstGeom>
+          <a:solidFill>
+            <a:srgbClr val="1B1B1B"/>
+          </a:solidFill>
+          <a:ln>
+            <a:noFill/>
+          </a:ln>
+          <a:effectLst/>
+        </p:spPr>
+        <p:style>
+          <a:lnRef idx="2">
+            <a:schemeClr val="accent1">
+              <a:shade val="15000"/>
+            </a:schemeClr>
+          </a:lnRef>
+          <a:fillRef idx="1">
+            <a:schemeClr val="accent1"/>
+          </a:fillRef>
+          <a:effectRef idx="0">
+            <a:schemeClr val="accent1"/>
+          </a:effectRef>
+          <a:fontRef idx="minor">
+            <a:schemeClr val="lt1"/>
+          </a:fontRef>
+        </p:style>
+        <p:txBody>
+          <a:bodyPr rtlCol="0" anchor="ctr"/>
+          <a:lstStyle/>
+          <a:p>
+            <a:pPr algn="ctr"/>
+            <a:endParaRPr lang="en-US" dirty="0"/>
+          </a:p>
+        </p:txBody>
+      </p:sp>
       <p:pic>
         <p:nvPicPr>
-          <p:cNvPr id="4" name="Picture 3">
-            <a:extLst>
-              <a:ext uri="{FF2B5EF4-FFF2-40B4-BE49-F238E27FC236}">
-                <a16:creationId xmlns:a16="http://schemas.microsoft.com/office/drawing/2014/main" id="{5465D906-3889-0E27-48A1-40B15F652F8A}"/>
+          <p:cNvPr id="5" name="Picture 4">
+            <a:extLst>
+              <a:ext uri="{FF2B5EF4-FFF2-40B4-BE49-F238E27FC236}">
+                <a16:creationId xmlns:a16="http://schemas.microsoft.com/office/drawing/2014/main" id="{3196DC37-5EE8-F340-180D-05445C3174AC}"/>
               </a:ext>
             </a:extLst>
           </p:cNvPr>
@@ -3350,14 +3403,20 @@
           <p:nvPr/>
         </p:nvPicPr>
         <p:blipFill rotWithShape="1">
-          <a:blip r:embed="rId2"/>
-          <a:srcRect l="13942" t="24167" r="14927" b="19186"/>
+          <a:blip r:embed="rId2">
+            <a:extLst>
+              <a:ext uri="{28A0092B-C50C-407E-A947-70E740481C1C}">
+                <a14:useLocalDpi xmlns:a14="http://schemas.microsoft.com/office/drawing/2010/main" val="0"/>
+              </a:ext>
+            </a:extLst>
+          </a:blip>
+          <a:srcRect l="748" t="21506" r="776" b="15625"/>
           <a:stretch/>
         </p:blipFill>
         <p:spPr>
           <a:xfrm>
-            <a:off x="-1" y="720436"/>
-            <a:ext cx="11804073" cy="5043055"/>
+            <a:off x="629267" y="1150374"/>
+            <a:ext cx="10627358" cy="4455275"/>
           </a:xfrm>
           <a:prstGeom prst="rect">
             <a:avLst/>
@@ -3417,14 +3476,14 @@
         </p:nvSpPr>
         <p:spPr>
           <a:xfrm>
-            <a:off x="243570" y="419948"/>
-            <a:ext cx="11316929" cy="6213986"/>
+            <a:off x="0" y="0"/>
+            <a:ext cx="12192000" cy="6857999"/>
           </a:xfrm>
           <a:prstGeom prst="rect">
             <a:avLst/>
           </a:prstGeom>
           <a:solidFill>
-            <a:srgbClr val="2E2E2E">
+            <a:srgbClr val="1B1B1B">
               <a:alpha val="80000"/>
             </a:srgbClr>
           </a:solidFill>
@@ -3573,8 +3632,8 @@
         </p:nvSpPr>
         <p:spPr>
           <a:xfrm>
-            <a:off x="3580621" y="4920083"/>
-            <a:ext cx="4116512" cy="264624"/>
+            <a:off x="3008315" y="4921382"/>
+            <a:ext cx="4897174" cy="264624"/>
           </a:xfrm>
           <a:prstGeom prst="rect">
             <a:avLst/>
@@ -3604,7 +3663,7 @@
                 </a:solidFill>
                 <a:latin typeface="Public Sans" pitchFamily="2" charset="0"/>
               </a:rPr>
-              <a:t>for U.S. Web Design System</a:t>
+              <a:t>for U.S. Web Design System sites</a:t>
             </a:r>
           </a:p>
         </p:txBody>

</xml_diff>